<commit_message>
fix: updated presentation ppt
</commit_message>
<xml_diff>
--- a/Project_Presentation.pptx
+++ b/Project_Presentation.pptx
@@ -4,6 +4,9 @@
   <p:sldMasterIdLst>
     <p:sldMasterId id="2147483798" r:id="rId1"/>
   </p:sldMasterIdLst>
+  <p:notesMasterIdLst>
+    <p:notesMasterId r:id="rId8"/>
+  </p:notesMasterIdLst>
   <p:sldIdLst>
     <p:sldId id="256" r:id="rId2"/>
     <p:sldId id="257" r:id="rId3"/>
@@ -109,7 +112,901 @@
       </a:defRPr>
     </a:lvl9pPr>
   </p:defaultTextStyle>
+  <p:extLst>
+    <p:ext uri="{EFAFB233-063F-42B5-8137-9DF3F51BA10A}">
+      <p15:sldGuideLst xmlns:p15="http://schemas.microsoft.com/office/powerpoint/2012/main"/>
+    </p:ext>
+  </p:extLst>
 </p:presentation>
+</file>
+
+<file path=ppt/notesMasters/notesMaster1.xml><?xml version="1.0" encoding="utf-8"?>
+<p:notesMaster xmlns:a="http://schemas.openxmlformats.org/drawingml/2006/main" xmlns:r="http://schemas.openxmlformats.org/officeDocument/2006/relationships" xmlns:p="http://schemas.openxmlformats.org/presentationml/2006/main">
+  <p:cSld>
+    <p:bg>
+      <p:bgRef idx="1001">
+        <a:schemeClr val="bg1"/>
+      </p:bgRef>
+    </p:bg>
+    <p:spTree>
+      <p:nvGrpSpPr>
+        <p:cNvPr id="1" name=""/>
+        <p:cNvGrpSpPr/>
+        <p:nvPr/>
+      </p:nvGrpSpPr>
+      <p:grpSpPr>
+        <a:xfrm>
+          <a:off x="0" y="0"/>
+          <a:ext cx="0" cy="0"/>
+          <a:chOff x="0" y="0"/>
+          <a:chExt cx="0" cy="0"/>
+        </a:xfrm>
+      </p:grpSpPr>
+      <p:sp>
+        <p:nvSpPr>
+          <p:cNvPr id="2" name="Header Placeholder 1"/>
+          <p:cNvSpPr>
+            <a:spLocks noGrp="1"/>
+          </p:cNvSpPr>
+          <p:nvPr>
+            <p:ph type="hdr" sz="quarter"/>
+          </p:nvPr>
+        </p:nvSpPr>
+        <p:spPr>
+          <a:xfrm>
+            <a:off x="0" y="0"/>
+            <a:ext cx="2971800" cy="458788"/>
+          </a:xfrm>
+          <a:prstGeom prst="rect">
+            <a:avLst/>
+          </a:prstGeom>
+        </p:spPr>
+        <p:txBody>
+          <a:bodyPr vert="horz" lIns="91440" tIns="45720" rIns="91440" bIns="45720" rtlCol="0"/>
+          <a:lstStyle>
+            <a:lvl1pPr algn="l">
+              <a:defRPr sz="1200"/>
+            </a:lvl1pPr>
+          </a:lstStyle>
+          <a:p>
+            <a:endParaRPr lang="en-US"/>
+          </a:p>
+        </p:txBody>
+      </p:sp>
+      <p:sp>
+        <p:nvSpPr>
+          <p:cNvPr id="3" name="Date Placeholder 2"/>
+          <p:cNvSpPr>
+            <a:spLocks noGrp="1"/>
+          </p:cNvSpPr>
+          <p:nvPr>
+            <p:ph type="dt" idx="1"/>
+          </p:nvPr>
+        </p:nvSpPr>
+        <p:spPr>
+          <a:xfrm>
+            <a:off x="3884613" y="0"/>
+            <a:ext cx="2971800" cy="458788"/>
+          </a:xfrm>
+          <a:prstGeom prst="rect">
+            <a:avLst/>
+          </a:prstGeom>
+        </p:spPr>
+        <p:txBody>
+          <a:bodyPr vert="horz" lIns="91440" tIns="45720" rIns="91440" bIns="45720" rtlCol="0"/>
+          <a:lstStyle>
+            <a:lvl1pPr algn="r">
+              <a:defRPr sz="1200"/>
+            </a:lvl1pPr>
+          </a:lstStyle>
+          <a:p>
+            <a:fld id="{041FD22F-83F9-604D-9529-63C6FFBD0A9B}" type="datetimeFigureOut">
+              <a:rPr lang="en-US" smtClean="0"/>
+              <a:t>12/13/23</a:t>
+            </a:fld>
+            <a:endParaRPr lang="en-US"/>
+          </a:p>
+        </p:txBody>
+      </p:sp>
+      <p:sp>
+        <p:nvSpPr>
+          <p:cNvPr id="4" name="Slide Image Placeholder 3"/>
+          <p:cNvSpPr>
+            <a:spLocks noGrp="1" noRot="1" noChangeAspect="1"/>
+          </p:cNvSpPr>
+          <p:nvPr>
+            <p:ph type="sldImg" idx="2"/>
+          </p:nvPr>
+        </p:nvSpPr>
+        <p:spPr>
+          <a:xfrm>
+            <a:off x="685800" y="1143000"/>
+            <a:ext cx="5486400" cy="3086100"/>
+          </a:xfrm>
+          <a:prstGeom prst="rect">
+            <a:avLst/>
+          </a:prstGeom>
+          <a:noFill/>
+          <a:ln w="12700">
+            <a:solidFill>
+              <a:prstClr val="black"/>
+            </a:solidFill>
+          </a:ln>
+        </p:spPr>
+        <p:txBody>
+          <a:bodyPr vert="horz" lIns="91440" tIns="45720" rIns="91440" bIns="45720" rtlCol="0" anchor="ctr"/>
+          <a:lstStyle/>
+          <a:p>
+            <a:endParaRPr lang="en-US"/>
+          </a:p>
+        </p:txBody>
+      </p:sp>
+      <p:sp>
+        <p:nvSpPr>
+          <p:cNvPr id="5" name="Notes Placeholder 4"/>
+          <p:cNvSpPr>
+            <a:spLocks noGrp="1"/>
+          </p:cNvSpPr>
+          <p:nvPr>
+            <p:ph type="body" sz="quarter" idx="3"/>
+          </p:nvPr>
+        </p:nvSpPr>
+        <p:spPr>
+          <a:xfrm>
+            <a:off x="685800" y="4400550"/>
+            <a:ext cx="5486400" cy="3600450"/>
+          </a:xfrm>
+          <a:prstGeom prst="rect">
+            <a:avLst/>
+          </a:prstGeom>
+        </p:spPr>
+        <p:txBody>
+          <a:bodyPr vert="horz" lIns="91440" tIns="45720" rIns="91440" bIns="45720" rtlCol="0"/>
+          <a:lstStyle/>
+          <a:p>
+            <a:pPr lvl="0"/>
+            <a:r>
+              <a:rPr lang="en-GB"/>
+              <a:t>Click to edit Master text styles</a:t>
+            </a:r>
+          </a:p>
+          <a:p>
+            <a:pPr lvl="1"/>
+            <a:r>
+              <a:rPr lang="en-GB"/>
+              <a:t>Second level</a:t>
+            </a:r>
+          </a:p>
+          <a:p>
+            <a:pPr lvl="2"/>
+            <a:r>
+              <a:rPr lang="en-GB"/>
+              <a:t>Third level</a:t>
+            </a:r>
+          </a:p>
+          <a:p>
+            <a:pPr lvl="3"/>
+            <a:r>
+              <a:rPr lang="en-GB"/>
+              <a:t>Fourth level</a:t>
+            </a:r>
+          </a:p>
+          <a:p>
+            <a:pPr lvl="4"/>
+            <a:r>
+              <a:rPr lang="en-GB"/>
+              <a:t>Fifth level</a:t>
+            </a:r>
+            <a:endParaRPr lang="en-US"/>
+          </a:p>
+        </p:txBody>
+      </p:sp>
+      <p:sp>
+        <p:nvSpPr>
+          <p:cNvPr id="6" name="Footer Placeholder 5"/>
+          <p:cNvSpPr>
+            <a:spLocks noGrp="1"/>
+          </p:cNvSpPr>
+          <p:nvPr>
+            <p:ph type="ftr" sz="quarter" idx="4"/>
+          </p:nvPr>
+        </p:nvSpPr>
+        <p:spPr>
+          <a:xfrm>
+            <a:off x="0" y="8685213"/>
+            <a:ext cx="2971800" cy="458787"/>
+          </a:xfrm>
+          <a:prstGeom prst="rect">
+            <a:avLst/>
+          </a:prstGeom>
+        </p:spPr>
+        <p:txBody>
+          <a:bodyPr vert="horz" lIns="91440" tIns="45720" rIns="91440" bIns="45720" rtlCol="0" anchor="b"/>
+          <a:lstStyle>
+            <a:lvl1pPr algn="l">
+              <a:defRPr sz="1200"/>
+            </a:lvl1pPr>
+          </a:lstStyle>
+          <a:p>
+            <a:endParaRPr lang="en-US"/>
+          </a:p>
+        </p:txBody>
+      </p:sp>
+      <p:sp>
+        <p:nvSpPr>
+          <p:cNvPr id="7" name="Slide Number Placeholder 6"/>
+          <p:cNvSpPr>
+            <a:spLocks noGrp="1"/>
+          </p:cNvSpPr>
+          <p:nvPr>
+            <p:ph type="sldNum" sz="quarter" idx="5"/>
+          </p:nvPr>
+        </p:nvSpPr>
+        <p:spPr>
+          <a:xfrm>
+            <a:off x="3884613" y="8685213"/>
+            <a:ext cx="2971800" cy="458787"/>
+          </a:xfrm>
+          <a:prstGeom prst="rect">
+            <a:avLst/>
+          </a:prstGeom>
+        </p:spPr>
+        <p:txBody>
+          <a:bodyPr vert="horz" lIns="91440" tIns="45720" rIns="91440" bIns="45720" rtlCol="0" anchor="b"/>
+          <a:lstStyle>
+            <a:lvl1pPr algn="r">
+              <a:defRPr sz="1200"/>
+            </a:lvl1pPr>
+          </a:lstStyle>
+          <a:p>
+            <a:fld id="{8C6F5086-02FA-9242-824C-95E63FD26FDB}" type="slidenum">
+              <a:rPr lang="en-US" smtClean="0"/>
+              <a:t>‹#›</a:t>
+            </a:fld>
+            <a:endParaRPr lang="en-US"/>
+          </a:p>
+        </p:txBody>
+      </p:sp>
+    </p:spTree>
+    <p:extLst>
+      <p:ext uri="{BB962C8B-B14F-4D97-AF65-F5344CB8AC3E}">
+        <p14:creationId xmlns:p14="http://schemas.microsoft.com/office/powerpoint/2010/main" val="2249064663"/>
+      </p:ext>
+    </p:extLst>
+  </p:cSld>
+  <p:clrMap bg1="lt1" tx1="dk1" bg2="lt2" tx2="dk2" accent1="accent1" accent2="accent2" accent3="accent3" accent4="accent4" accent5="accent5" accent6="accent6" hlink="hlink" folHlink="folHlink"/>
+  <p:notesStyle>
+    <a:lvl1pPr marL="0" algn="l" defTabSz="914400" rtl="0" eaLnBrk="1" latinLnBrk="0" hangingPunct="1">
+      <a:defRPr sz="1200" kern="1200">
+        <a:solidFill>
+          <a:schemeClr val="tx1"/>
+        </a:solidFill>
+        <a:latin typeface="+mn-lt"/>
+        <a:ea typeface="+mn-ea"/>
+        <a:cs typeface="+mn-cs"/>
+      </a:defRPr>
+    </a:lvl1pPr>
+    <a:lvl2pPr marL="457200" algn="l" defTabSz="914400" rtl="0" eaLnBrk="1" latinLnBrk="0" hangingPunct="1">
+      <a:defRPr sz="1200" kern="1200">
+        <a:solidFill>
+          <a:schemeClr val="tx1"/>
+        </a:solidFill>
+        <a:latin typeface="+mn-lt"/>
+        <a:ea typeface="+mn-ea"/>
+        <a:cs typeface="+mn-cs"/>
+      </a:defRPr>
+    </a:lvl2pPr>
+    <a:lvl3pPr marL="914400" algn="l" defTabSz="914400" rtl="0" eaLnBrk="1" latinLnBrk="0" hangingPunct="1">
+      <a:defRPr sz="1200" kern="1200">
+        <a:solidFill>
+          <a:schemeClr val="tx1"/>
+        </a:solidFill>
+        <a:latin typeface="+mn-lt"/>
+        <a:ea typeface="+mn-ea"/>
+        <a:cs typeface="+mn-cs"/>
+      </a:defRPr>
+    </a:lvl3pPr>
+    <a:lvl4pPr marL="1371600" algn="l" defTabSz="914400" rtl="0" eaLnBrk="1" latinLnBrk="0" hangingPunct="1">
+      <a:defRPr sz="1200" kern="1200">
+        <a:solidFill>
+          <a:schemeClr val="tx1"/>
+        </a:solidFill>
+        <a:latin typeface="+mn-lt"/>
+        <a:ea typeface="+mn-ea"/>
+        <a:cs typeface="+mn-cs"/>
+      </a:defRPr>
+    </a:lvl4pPr>
+    <a:lvl5pPr marL="1828800" algn="l" defTabSz="914400" rtl="0" eaLnBrk="1" latinLnBrk="0" hangingPunct="1">
+      <a:defRPr sz="1200" kern="1200">
+        <a:solidFill>
+          <a:schemeClr val="tx1"/>
+        </a:solidFill>
+        <a:latin typeface="+mn-lt"/>
+        <a:ea typeface="+mn-ea"/>
+        <a:cs typeface="+mn-cs"/>
+      </a:defRPr>
+    </a:lvl5pPr>
+    <a:lvl6pPr marL="2286000" algn="l" defTabSz="914400" rtl="0" eaLnBrk="1" latinLnBrk="0" hangingPunct="1">
+      <a:defRPr sz="1200" kern="1200">
+        <a:solidFill>
+          <a:schemeClr val="tx1"/>
+        </a:solidFill>
+        <a:latin typeface="+mn-lt"/>
+        <a:ea typeface="+mn-ea"/>
+        <a:cs typeface="+mn-cs"/>
+      </a:defRPr>
+    </a:lvl6pPr>
+    <a:lvl7pPr marL="2743200" algn="l" defTabSz="914400" rtl="0" eaLnBrk="1" latinLnBrk="0" hangingPunct="1">
+      <a:defRPr sz="1200" kern="1200">
+        <a:solidFill>
+          <a:schemeClr val="tx1"/>
+        </a:solidFill>
+        <a:latin typeface="+mn-lt"/>
+        <a:ea typeface="+mn-ea"/>
+        <a:cs typeface="+mn-cs"/>
+      </a:defRPr>
+    </a:lvl7pPr>
+    <a:lvl8pPr marL="3200400" algn="l" defTabSz="914400" rtl="0" eaLnBrk="1" latinLnBrk="0" hangingPunct="1">
+      <a:defRPr sz="1200" kern="1200">
+        <a:solidFill>
+          <a:schemeClr val="tx1"/>
+        </a:solidFill>
+        <a:latin typeface="+mn-lt"/>
+        <a:ea typeface="+mn-ea"/>
+        <a:cs typeface="+mn-cs"/>
+      </a:defRPr>
+    </a:lvl8pPr>
+    <a:lvl9pPr marL="3657600" algn="l" defTabSz="914400" rtl="0" eaLnBrk="1" latinLnBrk="0" hangingPunct="1">
+      <a:defRPr sz="1200" kern="1200">
+        <a:solidFill>
+          <a:schemeClr val="tx1"/>
+        </a:solidFill>
+        <a:latin typeface="+mn-lt"/>
+        <a:ea typeface="+mn-ea"/>
+        <a:cs typeface="+mn-cs"/>
+      </a:defRPr>
+    </a:lvl9pPr>
+  </p:notesStyle>
+</p:notesMaster>
+</file>
+
+<file path=ppt/notesSlides/notesSlide1.xml><?xml version="1.0" encoding="utf-8"?>
+<p:notes xmlns:a="http://schemas.openxmlformats.org/drawingml/2006/main" xmlns:r="http://schemas.openxmlformats.org/officeDocument/2006/relationships" xmlns:p="http://schemas.openxmlformats.org/presentationml/2006/main">
+  <p:cSld>
+    <p:spTree>
+      <p:nvGrpSpPr>
+        <p:cNvPr id="1" name=""/>
+        <p:cNvGrpSpPr/>
+        <p:nvPr/>
+      </p:nvGrpSpPr>
+      <p:grpSpPr>
+        <a:xfrm>
+          <a:off x="0" y="0"/>
+          <a:ext cx="0" cy="0"/>
+          <a:chOff x="0" y="0"/>
+          <a:chExt cx="0" cy="0"/>
+        </a:xfrm>
+      </p:grpSpPr>
+      <p:sp>
+        <p:nvSpPr>
+          <p:cNvPr id="2" name="Slide Image Placeholder 1"/>
+          <p:cNvSpPr>
+            <a:spLocks noGrp="1" noRot="1" noChangeAspect="1"/>
+          </p:cNvSpPr>
+          <p:nvPr>
+            <p:ph type="sldImg"/>
+          </p:nvPr>
+        </p:nvSpPr>
+        <p:spPr/>
+      </p:sp>
+      <p:sp>
+        <p:nvSpPr>
+          <p:cNvPr id="3" name="Notes Placeholder 2"/>
+          <p:cNvSpPr>
+            <a:spLocks noGrp="1"/>
+          </p:cNvSpPr>
+          <p:nvPr>
+            <p:ph type="body" idx="1"/>
+          </p:nvPr>
+        </p:nvSpPr>
+        <p:spPr/>
+        <p:txBody>
+          <a:bodyPr/>
+          <a:lstStyle/>
+          <a:p>
+            <a:r>
+              <a:rPr lang="en-US" dirty="0"/>
+              <a:t>Hello Everyone, Welcome to Data Center Scale Computing Project Presentation. Title of the project is Analysis of Video in Distributed Environment for Object Detection. My name is </a:t>
+            </a:r>
+            <a:r>
+              <a:rPr lang="en-US" dirty="0" err="1"/>
+              <a:t>Sachin</a:t>
+            </a:r>
+            <a:r>
+              <a:rPr lang="en-US" dirty="0"/>
+              <a:t> Rathod and my teammate is Anirudh </a:t>
+            </a:r>
+            <a:r>
+              <a:rPr lang="en-US" dirty="0" err="1"/>
+              <a:t>Kalghatkar</a:t>
+            </a:r>
+            <a:r>
+              <a:rPr lang="en-US" dirty="0"/>
+              <a:t>.</a:t>
+            </a:r>
+          </a:p>
+          <a:p>
+            <a:endParaRPr lang="en-US" dirty="0"/>
+          </a:p>
+          <a:p>
+            <a:pPr marL="0" marR="0" lvl="0" indent="0" algn="l" defTabSz="914400" rtl="0" eaLnBrk="1" fontAlgn="auto" latinLnBrk="0" hangingPunct="1">
+              <a:lnSpc>
+                <a:spcPct val="100000"/>
+              </a:lnSpc>
+              <a:spcBef>
+                <a:spcPts val="0"/>
+              </a:spcBef>
+              <a:spcAft>
+                <a:spcPts val="0"/>
+              </a:spcAft>
+              <a:buClrTx/>
+              <a:buSzTx/>
+              <a:buFontTx/>
+              <a:buNone/>
+              <a:tabLst/>
+              <a:defRPr/>
+            </a:pPr>
+            <a:r>
+              <a:rPr lang="en-US" dirty="0"/>
+              <a:t>Let's look at the overview and goals of the project. </a:t>
+            </a:r>
+          </a:p>
+        </p:txBody>
+      </p:sp>
+      <p:sp>
+        <p:nvSpPr>
+          <p:cNvPr id="4" name="Slide Number Placeholder 3"/>
+          <p:cNvSpPr>
+            <a:spLocks noGrp="1"/>
+          </p:cNvSpPr>
+          <p:nvPr>
+            <p:ph type="sldNum" sz="quarter" idx="5"/>
+          </p:nvPr>
+        </p:nvSpPr>
+        <p:spPr/>
+        <p:txBody>
+          <a:bodyPr/>
+          <a:lstStyle/>
+          <a:p>
+            <a:fld id="{8C6F5086-02FA-9242-824C-95E63FD26FDB}" type="slidenum">
+              <a:rPr lang="en-US" smtClean="0"/>
+              <a:t>1</a:t>
+            </a:fld>
+            <a:endParaRPr lang="en-US"/>
+          </a:p>
+        </p:txBody>
+      </p:sp>
+    </p:spTree>
+    <p:extLst>
+      <p:ext uri="{BB962C8B-B14F-4D97-AF65-F5344CB8AC3E}">
+        <p14:creationId xmlns:p14="http://schemas.microsoft.com/office/powerpoint/2010/main" val="2066543745"/>
+      </p:ext>
+    </p:extLst>
+  </p:cSld>
+  <p:clrMapOvr>
+    <a:masterClrMapping/>
+  </p:clrMapOvr>
+</p:notes>
+</file>
+
+<file path=ppt/notesSlides/notesSlide2.xml><?xml version="1.0" encoding="utf-8"?>
+<p:notes xmlns:a="http://schemas.openxmlformats.org/drawingml/2006/main" xmlns:r="http://schemas.openxmlformats.org/officeDocument/2006/relationships" xmlns:p="http://schemas.openxmlformats.org/presentationml/2006/main">
+  <p:cSld>
+    <p:spTree>
+      <p:nvGrpSpPr>
+        <p:cNvPr id="1" name=""/>
+        <p:cNvGrpSpPr/>
+        <p:nvPr/>
+      </p:nvGrpSpPr>
+      <p:grpSpPr>
+        <a:xfrm>
+          <a:off x="0" y="0"/>
+          <a:ext cx="0" cy="0"/>
+          <a:chOff x="0" y="0"/>
+          <a:chExt cx="0" cy="0"/>
+        </a:xfrm>
+      </p:grpSpPr>
+      <p:sp>
+        <p:nvSpPr>
+          <p:cNvPr id="2" name="Slide Image Placeholder 1"/>
+          <p:cNvSpPr>
+            <a:spLocks noGrp="1" noRot="1" noChangeAspect="1"/>
+          </p:cNvSpPr>
+          <p:nvPr>
+            <p:ph type="sldImg"/>
+          </p:nvPr>
+        </p:nvSpPr>
+        <p:spPr/>
+      </p:sp>
+      <p:sp>
+        <p:nvSpPr>
+          <p:cNvPr id="3" name="Notes Placeholder 2"/>
+          <p:cNvSpPr>
+            <a:spLocks noGrp="1"/>
+          </p:cNvSpPr>
+          <p:nvPr>
+            <p:ph type="body" idx="1"/>
+          </p:nvPr>
+        </p:nvSpPr>
+        <p:spPr/>
+        <p:txBody>
+          <a:bodyPr/>
+          <a:lstStyle/>
+          <a:p>
+            <a:r>
+              <a:rPr lang="en-US" sz="1800" dirty="0">
+                <a:effectLst/>
+                <a:latin typeface="Times New Roman" panose="02020603050405020304" pitchFamily="18" charset="0"/>
+                <a:ea typeface="Calibri" panose="020F0502020204030204" pitchFamily="34" charset="0"/>
+              </a:rPr>
+              <a:t>Our project focused on implementing a distributed video frame processing system for Object detection using a pre-trained Deep Neural Network (DNN). The objective was to input a video into the system and receive an output video where objects are highlighted, along with their count in each frame and the objects can be cars, people, or any other object supported by pre-trained DNN. This was achieved by dividing the video into individual frames, independently processing each frame for object detection using the pre-trained DNN at the worker nodes, and then merging the frames while maintaining the original order by the master node. The outcome is a modified video with highlighted objects and their respective counts. The project leverages distributed processing for scalability and efficiency, contributing to the intersection of data center scale computing, deep learning, and video analytics.</a:t>
+            </a:r>
+          </a:p>
+          <a:p>
+            <a:endParaRPr lang="en-US" sz="1800" dirty="0">
+              <a:effectLst/>
+              <a:latin typeface="Times New Roman" panose="02020603050405020304" pitchFamily="18" charset="0"/>
+              <a:ea typeface="Calibri" panose="020F0502020204030204" pitchFamily="34" charset="0"/>
+            </a:endParaRPr>
+          </a:p>
+          <a:p>
+            <a:r>
+              <a:rPr lang="en-US" sz="1800" dirty="0">
+                <a:effectLst/>
+                <a:latin typeface="Times New Roman" panose="02020603050405020304" pitchFamily="18" charset="0"/>
+                <a:ea typeface="Calibri" panose="020F0502020204030204" pitchFamily="34" charset="0"/>
+              </a:rPr>
+              <a:t>For our project we have configure pre-trained DNN to detect humans.</a:t>
+            </a:r>
+            <a:endParaRPr lang="en-IN" sz="1800" dirty="0">
+              <a:effectLst/>
+              <a:latin typeface="Times New Roman" panose="02020603050405020304" pitchFamily="18" charset="0"/>
+              <a:ea typeface="Calibri" panose="020F0502020204030204" pitchFamily="34" charset="0"/>
+            </a:endParaRPr>
+          </a:p>
+          <a:p>
+            <a:endParaRPr lang="en-IN" sz="1800" dirty="0">
+              <a:effectLst/>
+              <a:latin typeface="Times New Roman" panose="02020603050405020304" pitchFamily="18" charset="0"/>
+            </a:endParaRPr>
+          </a:p>
+          <a:p>
+            <a:pPr marL="0" marR="0" lvl="0" indent="0" algn="l" defTabSz="914400" rtl="0" eaLnBrk="1" fontAlgn="auto" latinLnBrk="0" hangingPunct="1">
+              <a:lnSpc>
+                <a:spcPct val="100000"/>
+              </a:lnSpc>
+              <a:spcBef>
+                <a:spcPts val="0"/>
+              </a:spcBef>
+              <a:spcAft>
+                <a:spcPts val="0"/>
+              </a:spcAft>
+              <a:buClrTx/>
+              <a:buSzTx/>
+              <a:buFontTx/>
+              <a:buNone/>
+              <a:tabLst/>
+              <a:defRPr/>
+            </a:pPr>
+            <a:r>
+              <a:rPr lang="en-IN" b="0" i="0" dirty="0">
+                <a:solidFill>
+                  <a:srgbClr val="526069"/>
+                </a:solidFill>
+                <a:effectLst/>
+                <a:latin typeface="Open Sans" panose="020F0502020204030204" pitchFamily="34" charset="0"/>
+              </a:rPr>
+              <a:t> Lets move on to Software Components and their interactions . </a:t>
+            </a:r>
+            <a:endParaRPr lang="en-US" dirty="0"/>
+          </a:p>
+        </p:txBody>
+      </p:sp>
+      <p:sp>
+        <p:nvSpPr>
+          <p:cNvPr id="4" name="Slide Number Placeholder 3"/>
+          <p:cNvSpPr>
+            <a:spLocks noGrp="1"/>
+          </p:cNvSpPr>
+          <p:nvPr>
+            <p:ph type="sldNum" sz="quarter" idx="5"/>
+          </p:nvPr>
+        </p:nvSpPr>
+        <p:spPr/>
+        <p:txBody>
+          <a:bodyPr/>
+          <a:lstStyle/>
+          <a:p>
+            <a:fld id="{8C6F5086-02FA-9242-824C-95E63FD26FDB}" type="slidenum">
+              <a:rPr lang="en-US" smtClean="0"/>
+              <a:t>2</a:t>
+            </a:fld>
+            <a:endParaRPr lang="en-US"/>
+          </a:p>
+        </p:txBody>
+      </p:sp>
+    </p:spTree>
+    <p:extLst>
+      <p:ext uri="{BB962C8B-B14F-4D97-AF65-F5344CB8AC3E}">
+        <p14:creationId xmlns:p14="http://schemas.microsoft.com/office/powerpoint/2010/main" val="1288919135"/>
+      </p:ext>
+    </p:extLst>
+  </p:cSld>
+  <p:clrMapOvr>
+    <a:masterClrMapping/>
+  </p:clrMapOvr>
+</p:notes>
+</file>
+
+<file path=ppt/notesSlides/notesSlide3.xml><?xml version="1.0" encoding="utf-8"?>
+<p:notes xmlns:a="http://schemas.openxmlformats.org/drawingml/2006/main" xmlns:r="http://schemas.openxmlformats.org/officeDocument/2006/relationships" xmlns:p="http://schemas.openxmlformats.org/presentationml/2006/main">
+  <p:cSld>
+    <p:spTree>
+      <p:nvGrpSpPr>
+        <p:cNvPr id="1" name=""/>
+        <p:cNvGrpSpPr/>
+        <p:nvPr/>
+      </p:nvGrpSpPr>
+      <p:grpSpPr>
+        <a:xfrm>
+          <a:off x="0" y="0"/>
+          <a:ext cx="0" cy="0"/>
+          <a:chOff x="0" y="0"/>
+          <a:chExt cx="0" cy="0"/>
+        </a:xfrm>
+      </p:grpSpPr>
+      <p:sp>
+        <p:nvSpPr>
+          <p:cNvPr id="2" name="Slide Image Placeholder 1"/>
+          <p:cNvSpPr>
+            <a:spLocks noGrp="1" noRot="1" noChangeAspect="1"/>
+          </p:cNvSpPr>
+          <p:nvPr>
+            <p:ph type="sldImg"/>
+          </p:nvPr>
+        </p:nvSpPr>
+        <p:spPr/>
+      </p:sp>
+      <p:sp>
+        <p:nvSpPr>
+          <p:cNvPr id="3" name="Notes Placeholder 2"/>
+          <p:cNvSpPr>
+            <a:spLocks noGrp="1"/>
+          </p:cNvSpPr>
+          <p:nvPr>
+            <p:ph type="body" idx="1"/>
+          </p:nvPr>
+        </p:nvSpPr>
+        <p:spPr/>
+        <p:txBody>
+          <a:bodyPr/>
+          <a:lstStyle/>
+          <a:p>
+            <a:r>
+              <a:rPr lang="en-US" dirty="0"/>
+              <a:t>We have four main components as shown in the architecture diagram those are </a:t>
+            </a:r>
+          </a:p>
+          <a:p>
+            <a:r>
+              <a:rPr lang="en-US" dirty="0"/>
+              <a:t> </a:t>
+            </a:r>
+          </a:p>
+          <a:p>
+            <a:r>
+              <a:rPr lang="en-US" dirty="0"/>
+              <a:t>Rest Server – For client server interaction.</a:t>
+            </a:r>
+          </a:p>
+          <a:p>
+            <a:r>
+              <a:rPr lang="en-US" dirty="0"/>
+              <a:t>Then Virtual Machines – For master and worker nodes.</a:t>
+            </a:r>
+          </a:p>
+          <a:p>
+            <a:r>
+              <a:rPr lang="en-US" dirty="0"/>
+              <a:t>Also We have made use of </a:t>
+            </a:r>
+            <a:r>
+              <a:rPr lang="en-US" dirty="0" err="1"/>
+              <a:t>ZeroMQ</a:t>
+            </a:r>
+            <a:r>
+              <a:rPr lang="en-US" dirty="0"/>
+              <a:t> – for message queue. Reason for choosing </a:t>
+            </a:r>
+            <a:r>
+              <a:rPr lang="en-US" dirty="0" err="1"/>
+              <a:t>ZeroMQ</a:t>
+            </a:r>
+            <a:r>
+              <a:rPr lang="en-US" dirty="0"/>
+              <a:t> is because it has special wrapper called as </a:t>
+            </a:r>
+            <a:r>
+              <a:rPr lang="en-US" dirty="0" err="1"/>
+              <a:t>ImageZMQ</a:t>
+            </a:r>
+            <a:r>
+              <a:rPr lang="en-US" dirty="0"/>
+              <a:t> for transferring images/</a:t>
+            </a:r>
+          </a:p>
+          <a:p>
+            <a:r>
+              <a:rPr lang="en-US" dirty="0"/>
+              <a:t>Lastly, Google Cloud Storage – to store and retrieve original and processed videos.</a:t>
+            </a:r>
+          </a:p>
+          <a:p>
+            <a:endParaRPr lang="en-US" dirty="0"/>
+          </a:p>
+          <a:p>
+            <a:r>
+              <a:rPr lang="en-US" dirty="0"/>
+              <a:t>Now, speaking on the interactions between each components.</a:t>
+            </a:r>
+          </a:p>
+          <a:p>
+            <a:endParaRPr lang="en-US" dirty="0"/>
+          </a:p>
+          <a:p>
+            <a:r>
+              <a:rPr lang="en-US" dirty="0"/>
+              <a:t>Client/front end app makes a post request to the rest-server with video data attached as a base64 string.</a:t>
+            </a:r>
+          </a:p>
+          <a:p>
+            <a:r>
+              <a:rPr lang="en-US" dirty="0"/>
+              <a:t>Then rest-server uploads the video to the google cloud storage and sends back the public </a:t>
+            </a:r>
+            <a:r>
+              <a:rPr lang="en-US" dirty="0" err="1"/>
+              <a:t>url</a:t>
+            </a:r>
+            <a:r>
+              <a:rPr lang="en-US" dirty="0"/>
+              <a:t> of the video to the client.</a:t>
+            </a:r>
+          </a:p>
+          <a:p>
+            <a:endParaRPr lang="en-US" dirty="0"/>
+          </a:p>
+          <a:p>
+            <a:r>
+              <a:rPr lang="en-US" dirty="0"/>
+              <a:t>Upon receiving the public </a:t>
+            </a:r>
+            <a:r>
+              <a:rPr lang="en-US" dirty="0" err="1"/>
+              <a:t>url</a:t>
+            </a:r>
+            <a:r>
+              <a:rPr lang="en-US" dirty="0"/>
+              <a:t> back from the rest-server, client now makes a request for analysis of the video by sending in the public </a:t>
+            </a:r>
+            <a:r>
+              <a:rPr lang="en-US" dirty="0" err="1"/>
+              <a:t>url</a:t>
+            </a:r>
+            <a:r>
+              <a:rPr lang="en-US" dirty="0"/>
+              <a:t>.</a:t>
+            </a:r>
+          </a:p>
+          <a:p>
+            <a:endParaRPr lang="en-US" dirty="0"/>
+          </a:p>
+          <a:p>
+            <a:r>
+              <a:rPr lang="en-US" dirty="0"/>
+              <a:t>Rest-server then commands master node to process the video.</a:t>
+            </a:r>
+          </a:p>
+          <a:p>
+            <a:endParaRPr lang="en-US" dirty="0"/>
+          </a:p>
+          <a:p>
+            <a:r>
+              <a:rPr lang="en-US" dirty="0"/>
+              <a:t>At master node – the video is downloaded and split into frames, then the batches of frames are put into the message queue, here we have set 100 as a batch number for the frames.</a:t>
+            </a:r>
+          </a:p>
+          <a:p>
+            <a:r>
+              <a:rPr lang="en-US" dirty="0"/>
+              <a:t>Then worker nodes pick up the frame batch from the message queue and start analyzing the video for human detection. Upon completion of the analysis these frame batches are sent back to the master node where the frames get merged </a:t>
+            </a:r>
+            <a:r>
+              <a:rPr lang="en-US" sz="1200" dirty="0">
+                <a:effectLst/>
+                <a:latin typeface="Times New Roman" panose="02020603050405020304" pitchFamily="18" charset="0"/>
+                <a:ea typeface="Calibri" panose="020F0502020204030204" pitchFamily="34" charset="0"/>
+              </a:rPr>
+              <a:t>while maintaining the original order</a:t>
+            </a:r>
+            <a:r>
+              <a:rPr lang="en-US" dirty="0"/>
+              <a:t>.</a:t>
+            </a:r>
+            <a:br>
+              <a:rPr lang="en-US" dirty="0"/>
+            </a:br>
+            <a:br>
+              <a:rPr lang="en-US" dirty="0"/>
+            </a:br>
+            <a:r>
+              <a:rPr lang="en-US" dirty="0"/>
+              <a:t>Once the video is merged, it is uploaded to the google cloud storage and the public </a:t>
+            </a:r>
+            <a:r>
+              <a:rPr lang="en-US" dirty="0" err="1"/>
+              <a:t>url</a:t>
+            </a:r>
+            <a:r>
+              <a:rPr lang="en-US" dirty="0"/>
+              <a:t> is sent back to the client.</a:t>
+            </a:r>
+          </a:p>
+          <a:p>
+            <a:endParaRPr lang="en-US" dirty="0"/>
+          </a:p>
+          <a:p>
+            <a:r>
+              <a:rPr lang="en-US" dirty="0"/>
+              <a:t>Now, Anirudh will walk you through the demo and testing the of the system.</a:t>
+            </a:r>
+          </a:p>
+        </p:txBody>
+      </p:sp>
+      <p:sp>
+        <p:nvSpPr>
+          <p:cNvPr id="4" name="Slide Number Placeholder 3"/>
+          <p:cNvSpPr>
+            <a:spLocks noGrp="1"/>
+          </p:cNvSpPr>
+          <p:nvPr>
+            <p:ph type="sldNum" sz="quarter" idx="5"/>
+          </p:nvPr>
+        </p:nvSpPr>
+        <p:spPr/>
+        <p:txBody>
+          <a:bodyPr/>
+          <a:lstStyle/>
+          <a:p>
+            <a:fld id="{8C6F5086-02FA-9242-824C-95E63FD26FDB}" type="slidenum">
+              <a:rPr lang="en-US" smtClean="0"/>
+              <a:t>3</a:t>
+            </a:fld>
+            <a:endParaRPr lang="en-US"/>
+          </a:p>
+        </p:txBody>
+      </p:sp>
+    </p:spTree>
+    <p:extLst>
+      <p:ext uri="{BB962C8B-B14F-4D97-AF65-F5344CB8AC3E}">
+        <p14:creationId xmlns:p14="http://schemas.microsoft.com/office/powerpoint/2010/main" val="3581494261"/>
+      </p:ext>
+    </p:extLst>
+  </p:cSld>
+  <p:clrMapOvr>
+    <a:masterClrMapping/>
+  </p:clrMapOvr>
+</p:notes>
 </file>
 
 <file path=ppt/slideLayouts/slideLayout1.xml><?xml version="1.0" encoding="utf-8"?>
@@ -263,7 +1160,7 @@
           <a:p>
             <a:fld id="{B5898F52-2787-4BA2-BBBC-9395E9F86D50}" type="datetimeFigureOut">
               <a:rPr lang="en-US" smtClean="0"/>
-              <a:t>12/12/23</a:t>
+              <a:t>12/13/23</a:t>
             </a:fld>
             <a:endParaRPr lang="en-US"/>
           </a:p>
@@ -461,7 +1358,7 @@
           <a:p>
             <a:fld id="{B5898F52-2787-4BA2-BBBC-9395E9F86D50}" type="datetimeFigureOut">
               <a:rPr lang="en-US" smtClean="0"/>
-              <a:t>12/12/23</a:t>
+              <a:t>12/13/23</a:t>
             </a:fld>
             <a:endParaRPr lang="en-US"/>
           </a:p>
@@ -669,7 +1566,7 @@
           <a:p>
             <a:fld id="{B5898F52-2787-4BA2-BBBC-9395E9F86D50}" type="datetimeFigureOut">
               <a:rPr lang="en-US" smtClean="0"/>
-              <a:t>12/12/23</a:t>
+              <a:t>12/13/23</a:t>
             </a:fld>
             <a:endParaRPr lang="en-US"/>
           </a:p>
@@ -867,7 +1764,7 @@
           <a:p>
             <a:fld id="{B5898F52-2787-4BA2-BBBC-9395E9F86D50}" type="datetimeFigureOut">
               <a:rPr lang="en-US" smtClean="0"/>
-              <a:t>12/12/23</a:t>
+              <a:t>12/13/23</a:t>
             </a:fld>
             <a:endParaRPr lang="en-US"/>
           </a:p>
@@ -1144,7 +2041,7 @@
           <a:p>
             <a:fld id="{B5898F52-2787-4BA2-BBBC-9395E9F86D50}" type="datetimeFigureOut">
               <a:rPr lang="en-US" smtClean="0"/>
-              <a:t>12/12/23</a:t>
+              <a:t>12/13/23</a:t>
             </a:fld>
             <a:endParaRPr lang="en-US"/>
           </a:p>
@@ -1409,7 +2306,7 @@
           <a:p>
             <a:fld id="{B5898F52-2787-4BA2-BBBC-9395E9F86D50}" type="datetimeFigureOut">
               <a:rPr lang="en-US" smtClean="0"/>
-              <a:t>12/12/23</a:t>
+              <a:t>12/13/23</a:t>
             </a:fld>
             <a:endParaRPr lang="en-US"/>
           </a:p>
@@ -1839,7 +2736,7 @@
           <a:p>
             <a:fld id="{B5898F52-2787-4BA2-BBBC-9395E9F86D50}" type="datetimeFigureOut">
               <a:rPr lang="en-US" smtClean="0"/>
-              <a:t>12/12/23</a:t>
+              <a:t>12/13/23</a:t>
             </a:fld>
             <a:endParaRPr lang="en-US"/>
           </a:p>
@@ -1980,7 +2877,7 @@
           <a:p>
             <a:fld id="{B5898F52-2787-4BA2-BBBC-9395E9F86D50}" type="datetimeFigureOut">
               <a:rPr lang="en-US" smtClean="0"/>
-              <a:t>12/12/23</a:t>
+              <a:t>12/13/23</a:t>
             </a:fld>
             <a:endParaRPr lang="en-US"/>
           </a:p>
@@ -2093,7 +2990,7 @@
           <a:p>
             <a:fld id="{B5898F52-2787-4BA2-BBBC-9395E9F86D50}" type="datetimeFigureOut">
               <a:rPr lang="en-US" smtClean="0"/>
-              <a:t>12/12/23</a:t>
+              <a:t>12/13/23</a:t>
             </a:fld>
             <a:endParaRPr lang="en-US"/>
           </a:p>
@@ -2404,7 +3301,7 @@
           <a:p>
             <a:fld id="{B5898F52-2787-4BA2-BBBC-9395E9F86D50}" type="datetimeFigureOut">
               <a:rPr lang="en-US" smtClean="0"/>
-              <a:t>12/12/23</a:t>
+              <a:t>12/13/23</a:t>
             </a:fld>
             <a:endParaRPr lang="en-US"/>
           </a:p>
@@ -2692,7 +3589,7 @@
           <a:p>
             <a:fld id="{B5898F52-2787-4BA2-BBBC-9395E9F86D50}" type="datetimeFigureOut">
               <a:rPr lang="en-US" smtClean="0"/>
-              <a:t>12/12/23</a:t>
+              <a:t>12/13/23</a:t>
             </a:fld>
             <a:endParaRPr lang="en-US"/>
           </a:p>
@@ -7642,7 +8539,7 @@
             <a:fld id="{B5898F52-2787-4BA2-BBBC-9395E9F86D50}" type="datetimeFigureOut">
               <a:rPr lang="en-US" smtClean="0"/>
               <a:pPr/>
-              <a:t>12/12/23</a:t>
+              <a:t>12/13/23</a:t>
             </a:fld>
             <a:endParaRPr lang="en-US" dirty="0"/>
           </a:p>
@@ -8301,7 +9198,7 @@
           <p:nvPr/>
         </p:nvPicPr>
         <p:blipFill rotWithShape="1">
-          <a:blip r:embed="rId2"/>
+          <a:blip r:embed="rId3"/>
           <a:srcRect l="24376"/>
           <a:stretch/>
         </p:blipFill>
@@ -8503,10 +9400,10 @@
       </p:sp>
       <p:pic>
         <p:nvPicPr>
-          <p:cNvPr id="4" name="Picture 3" descr="A diagram of a computer process&#10;&#10;Description automatically generated">
+          <p:cNvPr id="3" name="Picture 2" descr="A diagram of a cloud storage server&#10;&#10;Description automatically generated">
             <a:extLst>
               <a:ext uri="{FF2B5EF4-FFF2-40B4-BE49-F238E27FC236}">
-                <a16:creationId xmlns:a16="http://schemas.microsoft.com/office/drawing/2014/main" id="{C6BA05BC-EE38-482A-EDBE-115EFFC1EF21}"/>
+                <a16:creationId xmlns:a16="http://schemas.microsoft.com/office/drawing/2014/main" id="{7E8BB480-D7C9-F327-4BAE-C9523AF31406}"/>
               </a:ext>
             </a:extLst>
           </p:cNvPr>
@@ -8516,7 +9413,7 @@
           <p:nvPr/>
         </p:nvPicPr>
         <p:blipFill>
-          <a:blip r:embed="rId2">
+          <a:blip r:embed="rId3" cstate="print">
             <a:extLst>
               <a:ext uri="{28A0092B-C50C-407E-A947-70E740481C1C}">
                 <a14:useLocalDpi xmlns:a14="http://schemas.microsoft.com/office/drawing/2010/main" val="0"/>
@@ -8529,8 +9426,8 @@
         </p:blipFill>
         <p:spPr>
           <a:xfrm>
-            <a:off x="1863393" y="1828483"/>
-            <a:ext cx="8046920" cy="4868531"/>
+            <a:off x="1488141" y="1825625"/>
+            <a:ext cx="8686166" cy="4529455"/>
           </a:xfrm>
           <a:prstGeom prst="rect">
             <a:avLst/>
@@ -8949,6 +9846,301 @@
 </a:theme>
 </file>
 
+<file path=ppt/theme/theme2.xml><?xml version="1.0" encoding="utf-8"?>
+<a:theme xmlns:a="http://schemas.openxmlformats.org/drawingml/2006/main" name="Office Theme">
+  <a:themeElements>
+    <a:clrScheme name="Office">
+      <a:dk1>
+        <a:sysClr val="windowText" lastClr="000000"/>
+      </a:dk1>
+      <a:lt1>
+        <a:sysClr val="window" lastClr="FFFFFF"/>
+      </a:lt1>
+      <a:dk2>
+        <a:srgbClr val="44546A"/>
+      </a:dk2>
+      <a:lt2>
+        <a:srgbClr val="E7E6E6"/>
+      </a:lt2>
+      <a:accent1>
+        <a:srgbClr val="4472C4"/>
+      </a:accent1>
+      <a:accent2>
+        <a:srgbClr val="ED7D31"/>
+      </a:accent2>
+      <a:accent3>
+        <a:srgbClr val="A5A5A5"/>
+      </a:accent3>
+      <a:accent4>
+        <a:srgbClr val="FFC000"/>
+      </a:accent4>
+      <a:accent5>
+        <a:srgbClr val="5B9BD5"/>
+      </a:accent5>
+      <a:accent6>
+        <a:srgbClr val="70AD47"/>
+      </a:accent6>
+      <a:hlink>
+        <a:srgbClr val="0563C1"/>
+      </a:hlink>
+      <a:folHlink>
+        <a:srgbClr val="954F72"/>
+      </a:folHlink>
+    </a:clrScheme>
+    <a:fontScheme name="Office">
+      <a:majorFont>
+        <a:latin typeface="Calibri Light" panose="020F0302020204030204"/>
+        <a:ea typeface=""/>
+        <a:cs typeface=""/>
+        <a:font script="Jpan" typeface="游ゴシック Light"/>
+        <a:font script="Hang" typeface="맑은 고딕"/>
+        <a:font script="Hans" typeface="等线 Light"/>
+        <a:font script="Hant" typeface="新細明體"/>
+        <a:font script="Arab" typeface="Times New Roman"/>
+        <a:font script="Hebr" typeface="Times New Roman"/>
+        <a:font script="Thai" typeface="Angsana New"/>
+        <a:font script="Ethi" typeface="Nyala"/>
+        <a:font script="Beng" typeface="Vrinda"/>
+        <a:font script="Gujr" typeface="Shruti"/>
+        <a:font script="Khmr" typeface="MoolBoran"/>
+        <a:font script="Knda" typeface="Tunga"/>
+        <a:font script="Guru" typeface="Raavi"/>
+        <a:font script="Cans" typeface="Euphemia"/>
+        <a:font script="Cher" typeface="Plantagenet Cherokee"/>
+        <a:font script="Yiii" typeface="Microsoft Yi Baiti"/>
+        <a:font script="Tibt" typeface="Microsoft Himalaya"/>
+        <a:font script="Thaa" typeface="MV Boli"/>
+        <a:font script="Deva" typeface="Mangal"/>
+        <a:font script="Telu" typeface="Gautami"/>
+        <a:font script="Taml" typeface="Latha"/>
+        <a:font script="Syrc" typeface="Estrangelo Edessa"/>
+        <a:font script="Orya" typeface="Kalinga"/>
+        <a:font script="Mlym" typeface="Kartika"/>
+        <a:font script="Laoo" typeface="DokChampa"/>
+        <a:font script="Sinh" typeface="Iskoola Pota"/>
+        <a:font script="Mong" typeface="Mongolian Baiti"/>
+        <a:font script="Viet" typeface="Times New Roman"/>
+        <a:font script="Uigh" typeface="Microsoft Uighur"/>
+        <a:font script="Geor" typeface="Sylfaen"/>
+        <a:font script="Armn" typeface="Arial"/>
+        <a:font script="Bugi" typeface="Leelawadee UI"/>
+        <a:font script="Bopo" typeface="Microsoft JhengHei"/>
+        <a:font script="Java" typeface="Javanese Text"/>
+        <a:font script="Lisu" typeface="Segoe UI"/>
+        <a:font script="Mymr" typeface="Myanmar Text"/>
+        <a:font script="Nkoo" typeface="Ebrima"/>
+        <a:font script="Olck" typeface="Nirmala UI"/>
+        <a:font script="Osma" typeface="Ebrima"/>
+        <a:font script="Phag" typeface="Phagspa"/>
+        <a:font script="Syrn" typeface="Estrangelo Edessa"/>
+        <a:font script="Syrj" typeface="Estrangelo Edessa"/>
+        <a:font script="Syre" typeface="Estrangelo Edessa"/>
+        <a:font script="Sora" typeface="Nirmala UI"/>
+        <a:font script="Tale" typeface="Microsoft Tai Le"/>
+        <a:font script="Talu" typeface="Microsoft New Tai Lue"/>
+        <a:font script="Tfng" typeface="Ebrima"/>
+      </a:majorFont>
+      <a:minorFont>
+        <a:latin typeface="Calibri" panose="020F0502020204030204"/>
+        <a:ea typeface=""/>
+        <a:cs typeface=""/>
+        <a:font script="Jpan" typeface="游ゴシック"/>
+        <a:font script="Hang" typeface="맑은 고딕"/>
+        <a:font script="Hans" typeface="等线"/>
+        <a:font script="Hant" typeface="新細明體"/>
+        <a:font script="Arab" typeface="Arial"/>
+        <a:font script="Hebr" typeface="Arial"/>
+        <a:font script="Thai" typeface="Cordia New"/>
+        <a:font script="Ethi" typeface="Nyala"/>
+        <a:font script="Beng" typeface="Vrinda"/>
+        <a:font script="Gujr" typeface="Shruti"/>
+        <a:font script="Khmr" typeface="DaunPenh"/>
+        <a:font script="Knda" typeface="Tunga"/>
+        <a:font script="Guru" typeface="Raavi"/>
+        <a:font script="Cans" typeface="Euphemia"/>
+        <a:font script="Cher" typeface="Plantagenet Cherokee"/>
+        <a:font script="Yiii" typeface="Microsoft Yi Baiti"/>
+        <a:font script="Tibt" typeface="Microsoft Himalaya"/>
+        <a:font script="Thaa" typeface="MV Boli"/>
+        <a:font script="Deva" typeface="Mangal"/>
+        <a:font script="Telu" typeface="Gautami"/>
+        <a:font script="Taml" typeface="Latha"/>
+        <a:font script="Syrc" typeface="Estrangelo Edessa"/>
+        <a:font script="Orya" typeface="Kalinga"/>
+        <a:font script="Mlym" typeface="Kartika"/>
+        <a:font script="Laoo" typeface="DokChampa"/>
+        <a:font script="Sinh" typeface="Iskoola Pota"/>
+        <a:font script="Mong" typeface="Mongolian Baiti"/>
+        <a:font script="Viet" typeface="Arial"/>
+        <a:font script="Uigh" typeface="Microsoft Uighur"/>
+        <a:font script="Geor" typeface="Sylfaen"/>
+        <a:font script="Armn" typeface="Arial"/>
+        <a:font script="Bugi" typeface="Leelawadee UI"/>
+        <a:font script="Bopo" typeface="Microsoft JhengHei"/>
+        <a:font script="Java" typeface="Javanese Text"/>
+        <a:font script="Lisu" typeface="Segoe UI"/>
+        <a:font script="Mymr" typeface="Myanmar Text"/>
+        <a:font script="Nkoo" typeface="Ebrima"/>
+        <a:font script="Olck" typeface="Nirmala UI"/>
+        <a:font script="Osma" typeface="Ebrima"/>
+        <a:font script="Phag" typeface="Phagspa"/>
+        <a:font script="Syrn" typeface="Estrangelo Edessa"/>
+        <a:font script="Syrj" typeface="Estrangelo Edessa"/>
+        <a:font script="Syre" typeface="Estrangelo Edessa"/>
+        <a:font script="Sora" typeface="Nirmala UI"/>
+        <a:font script="Tale" typeface="Microsoft Tai Le"/>
+        <a:font script="Talu" typeface="Microsoft New Tai Lue"/>
+        <a:font script="Tfng" typeface="Ebrima"/>
+      </a:minorFont>
+    </a:fontScheme>
+    <a:fmtScheme name="Office">
+      <a:fillStyleLst>
+        <a:solidFill>
+          <a:schemeClr val="phClr"/>
+        </a:solidFill>
+        <a:gradFill rotWithShape="1">
+          <a:gsLst>
+            <a:gs pos="0">
+              <a:schemeClr val="phClr">
+                <a:lumMod val="110000"/>
+                <a:satMod val="105000"/>
+                <a:tint val="67000"/>
+              </a:schemeClr>
+            </a:gs>
+            <a:gs pos="50000">
+              <a:schemeClr val="phClr">
+                <a:lumMod val="105000"/>
+                <a:satMod val="103000"/>
+                <a:tint val="73000"/>
+              </a:schemeClr>
+            </a:gs>
+            <a:gs pos="100000">
+              <a:schemeClr val="phClr">
+                <a:lumMod val="105000"/>
+                <a:satMod val="109000"/>
+                <a:tint val="81000"/>
+              </a:schemeClr>
+            </a:gs>
+          </a:gsLst>
+          <a:lin ang="5400000" scaled="0"/>
+        </a:gradFill>
+        <a:gradFill rotWithShape="1">
+          <a:gsLst>
+            <a:gs pos="0">
+              <a:schemeClr val="phClr">
+                <a:satMod val="103000"/>
+                <a:lumMod val="102000"/>
+                <a:tint val="94000"/>
+              </a:schemeClr>
+            </a:gs>
+            <a:gs pos="50000">
+              <a:schemeClr val="phClr">
+                <a:satMod val="110000"/>
+                <a:lumMod val="100000"/>
+                <a:shade val="100000"/>
+              </a:schemeClr>
+            </a:gs>
+            <a:gs pos="100000">
+              <a:schemeClr val="phClr">
+                <a:lumMod val="99000"/>
+                <a:satMod val="120000"/>
+                <a:shade val="78000"/>
+              </a:schemeClr>
+            </a:gs>
+          </a:gsLst>
+          <a:lin ang="5400000" scaled="0"/>
+        </a:gradFill>
+      </a:fillStyleLst>
+      <a:lnStyleLst>
+        <a:ln w="6350" cap="flat" cmpd="sng" algn="ctr">
+          <a:solidFill>
+            <a:schemeClr val="phClr"/>
+          </a:solidFill>
+          <a:prstDash val="solid"/>
+          <a:miter lim="800000"/>
+        </a:ln>
+        <a:ln w="12700" cap="flat" cmpd="sng" algn="ctr">
+          <a:solidFill>
+            <a:schemeClr val="phClr"/>
+          </a:solidFill>
+          <a:prstDash val="solid"/>
+          <a:miter lim="800000"/>
+        </a:ln>
+        <a:ln w="19050" cap="flat" cmpd="sng" algn="ctr">
+          <a:solidFill>
+            <a:schemeClr val="phClr"/>
+          </a:solidFill>
+          <a:prstDash val="solid"/>
+          <a:miter lim="800000"/>
+        </a:ln>
+      </a:lnStyleLst>
+      <a:effectStyleLst>
+        <a:effectStyle>
+          <a:effectLst/>
+        </a:effectStyle>
+        <a:effectStyle>
+          <a:effectLst/>
+        </a:effectStyle>
+        <a:effectStyle>
+          <a:effectLst>
+            <a:outerShdw blurRad="57150" dist="19050" dir="5400000" algn="ctr" rotWithShape="0">
+              <a:srgbClr val="000000">
+                <a:alpha val="63000"/>
+              </a:srgbClr>
+            </a:outerShdw>
+          </a:effectLst>
+        </a:effectStyle>
+      </a:effectStyleLst>
+      <a:bgFillStyleLst>
+        <a:solidFill>
+          <a:schemeClr val="phClr"/>
+        </a:solidFill>
+        <a:solidFill>
+          <a:schemeClr val="phClr">
+            <a:tint val="95000"/>
+            <a:satMod val="170000"/>
+          </a:schemeClr>
+        </a:solidFill>
+        <a:gradFill rotWithShape="1">
+          <a:gsLst>
+            <a:gs pos="0">
+              <a:schemeClr val="phClr">
+                <a:tint val="93000"/>
+                <a:satMod val="150000"/>
+                <a:shade val="98000"/>
+                <a:lumMod val="102000"/>
+              </a:schemeClr>
+            </a:gs>
+            <a:gs pos="50000">
+              <a:schemeClr val="phClr">
+                <a:tint val="98000"/>
+                <a:satMod val="130000"/>
+                <a:shade val="90000"/>
+                <a:lumMod val="103000"/>
+              </a:schemeClr>
+            </a:gs>
+            <a:gs pos="100000">
+              <a:schemeClr val="phClr">
+                <a:shade val="63000"/>
+                <a:satMod val="120000"/>
+              </a:schemeClr>
+            </a:gs>
+          </a:gsLst>
+          <a:lin ang="5400000" scaled="0"/>
+        </a:gradFill>
+      </a:bgFillStyleLst>
+    </a:fmtScheme>
+  </a:themeElements>
+  <a:objectDefaults/>
+  <a:extraClrSchemeLst/>
+  <a:extLst>
+    <a:ext uri="{05A4C25C-085E-4340-85A3-A5531E510DB2}">
+      <thm15:themeFamily xmlns:thm15="http://schemas.microsoft.com/office/thememl/2012/main" name="Office Theme" id="{62F939B6-93AF-4DB8-9C6B-D6C7DFDC589F}" vid="{4A3C46E8-61CC-4603-A589-7422A47A8E4A}"/>
+    </a:ext>
+  </a:extLst>
+</a:theme>
+</file>
+
 <file path=ppt/webextensions/taskpanes.xml><?xml version="1.0" encoding="utf-8"?>
 <wetp:taskpanes xmlns:wetp="http://schemas.microsoft.com/office/webextensions/taskpanes/2010/11">
   <wetp:taskpane dockstate="right" visibility="0" width="350" row="0">

</xml_diff>